<commit_message>
removing lesson4 lab and code, updating ppts with correct titles, merging in Susans Lab 6 changes, updating Azats pictures to remove id info
</commit_message>
<xml_diff>
--- a/Complimentary Course Content/Module2/Lessons/Module2_Lesson6 Working with Node.js and Azure Table Storage.pptx
+++ b/Complimentary Course Content/Module2/Lessons/Module2_Lesson6 Working with Node.js and Azure Table Storage.pptx
@@ -187,7 +187,7 @@
       </p14:sectionLst>
     </p:ext>
     <p:ext uri="{EFAFB233-063F-42B5-8137-9DF3F51BA10A}">
-      <p15:sldGuideLst xmlns:p15="http://schemas.microsoft.com/office/powerpoint/2012/main" xmlns="">
+      <p15:sldGuideLst xmlns:p15="http://schemas.microsoft.com/office/powerpoint/2012/main">
         <p15:guide id="1" orient="horz" pos="3952" userDrawn="1">
           <p15:clr>
             <a:srgbClr val="A4A3A4"/>
@@ -306,7 +306,7 @@
             <a:fld id="{2E5CA586-3557-4985-BCD4-35EF5AC8B4A4}" type="datetimeFigureOut">
               <a:rPr lang="en-US" smtClean="0"/>
               <a:pPr/>
-              <a:t>7/1/16</a:t>
+              <a:t>12/20/16</a:t>
             </a:fld>
             <a:endParaRPr lang="en-US"/>
           </a:p>
@@ -5537,7 +5537,7 @@
   <p:clrMapOvr>
     <a:masterClrMapping/>
   </p:clrMapOvr>
-  <p:transition xmlns:p14="http://schemas.microsoft.com/office/powerpoint/2010/main">
+  <p:transition>
     <p:fade/>
   </p:transition>
 </p:sldLayout>
@@ -6158,7 +6158,7 @@
   <p:clrMapOvr>
     <a:masterClrMapping/>
   </p:clrMapOvr>
-  <p:transition xmlns:p14="http://schemas.microsoft.com/office/powerpoint/2010/main">
+  <p:transition>
     <p:fade/>
   </p:transition>
 </p:sldLayout>
@@ -6706,7 +6706,7 @@
           </a:ln>
           <a:extLst>
             <a:ext uri="{91240B29-F687-4f45-9708-019B960494DF}">
-              <a14:hiddenLine xmlns:a14="http://schemas.microsoft.com/office/drawing/2010/main" w="9525">
+              <a14:hiddenLine xmlns:a14="http://schemas.microsoft.com/office/drawing/2010/main" xmlns="" w="9525">
                 <a:solidFill>
                   <a:srgbClr val="000000"/>
                 </a:solidFill>
@@ -6744,7 +6744,7 @@
   <p:clrMapOvr>
     <a:masterClrMapping/>
   </p:clrMapOvr>
-  <p:transition xmlns:p14="http://schemas.microsoft.com/office/powerpoint/2010/main">
+  <p:transition>
     <p:fade/>
   </p:transition>
 </p:sldLayout>
@@ -8345,7 +8345,7 @@
   <p:clrMapOvr>
     <a:masterClrMapping/>
   </p:clrMapOvr>
-  <p:transition xmlns:p14="http://schemas.microsoft.com/office/powerpoint/2010/main">
+  <p:transition>
     <p:fade/>
   </p:transition>
 </p:sldLayout>
@@ -8974,7 +8974,7 @@
   <p:clrMapOvr>
     <a:masterClrMapping/>
   </p:clrMapOvr>
-  <p:transition xmlns:p14="http://schemas.microsoft.com/office/powerpoint/2010/main">
+  <p:transition>
     <p:fade/>
   </p:transition>
 </p:sldLayout>
@@ -9281,7 +9281,7 @@
             </a:ln>
             <a:extLst>
               <a:ext uri="{91240B29-F687-4f45-9708-019B960494DF}">
-                <a14:hiddenLine xmlns:a14="http://schemas.microsoft.com/office/drawing/2010/main" w="9525">
+                <a14:hiddenLine xmlns:a14="http://schemas.microsoft.com/office/drawing/2010/main" xmlns="" w="9525">
                   <a:solidFill>
                     <a:srgbClr val="000000"/>
                   </a:solidFill>
@@ -9860,7 +9860,7 @@
             </a:ln>
             <a:extLst>
               <a:ext uri="{91240B29-F687-4f45-9708-019B960494DF}">
-                <a14:hiddenLine xmlns:a14="http://schemas.microsoft.com/office/drawing/2010/main" w="9525">
+                <a14:hiddenLine xmlns:a14="http://schemas.microsoft.com/office/drawing/2010/main" xmlns="" w="9525">
                   <a:solidFill>
                     <a:srgbClr val="000000"/>
                   </a:solidFill>
@@ -9899,7 +9899,7 @@
   <p:clrMapOvr>
     <a:masterClrMapping/>
   </p:clrMapOvr>
-  <p:transition xmlns:p14="http://schemas.microsoft.com/office/powerpoint/2010/main">
+  <p:transition>
     <p:fade/>
   </p:transition>
 </p:sldLayout>
@@ -10036,7 +10036,7 @@
   <p:clrMapOvr>
     <a:masterClrMapping/>
   </p:clrMapOvr>
-  <p:transition xmlns:p14="http://schemas.microsoft.com/office/powerpoint/2010/main">
+  <p:transition>
     <p:fade/>
   </p:transition>
 </p:sldLayout>
@@ -11302,7 +11302,7 @@
             </a:ln>
             <a:extLst>
               <a:ext uri="{91240B29-F687-4f45-9708-019B960494DF}">
-                <a14:hiddenLine xmlns:a14="http://schemas.microsoft.com/office/drawing/2010/main" w="9525">
+                <a14:hiddenLine xmlns:a14="http://schemas.microsoft.com/office/drawing/2010/main" xmlns="" w="9525">
                   <a:solidFill>
                     <a:srgbClr val="000000"/>
                   </a:solidFill>
@@ -11353,7 +11353,7 @@
             </a:ln>
             <a:extLst>
               <a:ext uri="{91240B29-F687-4f45-9708-019B960494DF}">
-                <a14:hiddenLine xmlns:a14="http://schemas.microsoft.com/office/drawing/2010/main" w="9525">
+                <a14:hiddenLine xmlns:a14="http://schemas.microsoft.com/office/drawing/2010/main" xmlns="" w="9525">
                   <a:solidFill>
                     <a:srgbClr val="000000"/>
                   </a:solidFill>
@@ -11404,7 +11404,7 @@
             </a:ln>
             <a:extLst>
               <a:ext uri="{91240B29-F687-4f45-9708-019B960494DF}">
-                <a14:hiddenLine xmlns:a14="http://schemas.microsoft.com/office/drawing/2010/main" w="9525">
+                <a14:hiddenLine xmlns:a14="http://schemas.microsoft.com/office/drawing/2010/main" xmlns="" w="9525">
                   <a:solidFill>
                     <a:srgbClr val="000000"/>
                   </a:solidFill>
@@ -11455,7 +11455,7 @@
             </a:ln>
             <a:extLst>
               <a:ext uri="{91240B29-F687-4f45-9708-019B960494DF}">
-                <a14:hiddenLine xmlns:a14="http://schemas.microsoft.com/office/drawing/2010/main" w="9525">
+                <a14:hiddenLine xmlns:a14="http://schemas.microsoft.com/office/drawing/2010/main" xmlns="" w="9525">
                   <a:solidFill>
                     <a:srgbClr val="000000"/>
                   </a:solidFill>
@@ -11506,7 +11506,7 @@
             </a:ln>
             <a:extLst>
               <a:ext uri="{91240B29-F687-4f45-9708-019B960494DF}">
-                <a14:hiddenLine xmlns:a14="http://schemas.microsoft.com/office/drawing/2010/main" w="9525">
+                <a14:hiddenLine xmlns:a14="http://schemas.microsoft.com/office/drawing/2010/main" xmlns="" w="9525">
                   <a:solidFill>
                     <a:srgbClr val="000000"/>
                   </a:solidFill>
@@ -11653,7 +11653,7 @@
   <p:clrMapOvr>
     <a:overrideClrMapping bg1="lt1" tx1="dk1" bg2="lt2" tx2="dk2" accent1="accent1" accent2="accent2" accent3="accent3" accent4="accent4" accent5="accent5" accent6="accent6" hlink="hlink" folHlink="folHlink"/>
   </p:clrMapOvr>
-  <p:transition xmlns:p14="http://schemas.microsoft.com/office/powerpoint/2010/main">
+  <p:transition>
     <p:fade/>
   </p:transition>
 </p:sldLayout>
@@ -11906,7 +11906,7 @@
   <p:clrMapOvr>
     <a:masterClrMapping/>
   </p:clrMapOvr>
-  <p:transition xmlns:p14="http://schemas.microsoft.com/office/powerpoint/2010/main">
+  <p:transition>
     <p:fade/>
   </p:transition>
 </p:sldLayout>
@@ -12212,7 +12212,7 @@
   <p:clrMapOvr>
     <a:masterClrMapping/>
   </p:clrMapOvr>
-  <p:transition xmlns:p14="http://schemas.microsoft.com/office/powerpoint/2010/main">
+  <p:transition>
     <p:fade/>
   </p:transition>
 </p:sldLayout>
@@ -12427,7 +12427,7 @@
   <p:clrMapOvr>
     <a:masterClrMapping/>
   </p:clrMapOvr>
-  <p:transition xmlns:p14="http://schemas.microsoft.com/office/powerpoint/2010/main">
+  <p:transition>
     <p:fade/>
   </p:transition>
 </p:sldLayout>
@@ -12582,7 +12582,7 @@
   <p:clrMapOvr>
     <a:masterClrMapping/>
   </p:clrMapOvr>
-  <p:transition xmlns:p14="http://schemas.microsoft.com/office/powerpoint/2010/main">
+  <p:transition>
     <p:fade/>
   </p:transition>
 </p:sldLayout>
@@ -13221,7 +13221,7 @@
   <p:clrMapOvr>
     <a:masterClrMapping/>
   </p:clrMapOvr>
-  <p:transition xmlns:p14="http://schemas.microsoft.com/office/powerpoint/2010/main">
+  <p:transition>
     <p:fade/>
   </p:transition>
 </p:sldLayout>
@@ -13416,7 +13416,7 @@
   <p:clrMapOvr>
     <a:masterClrMapping/>
   </p:clrMapOvr>
-  <p:transition xmlns:p14="http://schemas.microsoft.com/office/powerpoint/2010/main">
+  <p:transition>
     <p:fade/>
   </p:transition>
 </p:sldLayout>
@@ -13571,7 +13571,7 @@
   <p:clrMapOvr>
     <a:masterClrMapping/>
   </p:clrMapOvr>
-  <p:transition xmlns:p14="http://schemas.microsoft.com/office/powerpoint/2010/main">
+  <p:transition>
     <p:fade/>
   </p:transition>
 </p:sldLayout>
@@ -13938,7 +13938,7 @@
   <p:clrMapOvr>
     <a:masterClrMapping/>
   </p:clrMapOvr>
-  <p:transition xmlns:p14="http://schemas.microsoft.com/office/powerpoint/2010/main">
+  <p:transition>
     <p:fade/>
   </p:transition>
 </p:sldLayout>
@@ -14395,7 +14395,7 @@
   <p:clrMapOvr>
     <a:masterClrMapping/>
   </p:clrMapOvr>
-  <p:transition xmlns:p14="http://schemas.microsoft.com/office/powerpoint/2010/main">
+  <p:transition>
     <p:fade/>
   </p:transition>
 </p:sldLayout>
@@ -14958,7 +14958,7 @@
   <p:clrMapOvr>
     <a:masterClrMapping/>
   </p:clrMapOvr>
-  <p:transition xmlns:p14="http://schemas.microsoft.com/office/powerpoint/2010/main">
+  <p:transition>
     <p:fade/>
   </p:transition>
 </p:sldLayout>
@@ -15060,7 +15060,7 @@
   <p:clrMapOvr>
     <a:masterClrMapping/>
   </p:clrMapOvr>
-  <p:transition xmlns:p14="http://schemas.microsoft.com/office/powerpoint/2010/main">
+  <p:transition>
     <p:fade/>
   </p:transition>
 </p:sldLayout>
@@ -15130,7 +15130,7 @@
   <p:clrMapOvr>
     <a:masterClrMapping/>
   </p:clrMapOvr>
-  <p:transition xmlns:p14="http://schemas.microsoft.com/office/powerpoint/2010/main">
+  <p:transition>
     <p:fade/>
   </p:transition>
 </p:sldLayout>
@@ -15163,7 +15163,7 @@
   <p:clrMapOvr>
     <a:masterClrMapping/>
   </p:clrMapOvr>
-  <p:transition xmlns:p14="http://schemas.microsoft.com/office/powerpoint/2010/main">
+  <p:transition>
     <p:fade/>
   </p:transition>
 </p:sldLayout>
@@ -15530,7 +15530,7 @@
   <p:clrMapOvr>
     <a:masterClrMapping/>
   </p:clrMapOvr>
-  <p:transition xmlns:p14="http://schemas.microsoft.com/office/powerpoint/2010/main">
+  <p:transition>
     <p:fade/>
   </p:transition>
 </p:sldLayout>
@@ -16124,7 +16124,7 @@
   <p:clrMapOvr>
     <a:masterClrMapping/>
   </p:clrMapOvr>
-  <p:transition xmlns:p14="http://schemas.microsoft.com/office/powerpoint/2010/main">
+  <p:transition>
     <p:fade/>
   </p:transition>
 </p:sldLayout>
@@ -16745,7 +16745,7 @@
   <p:clrMapOvr>
     <a:masterClrMapping/>
   </p:clrMapOvr>
-  <p:transition xmlns:p14="http://schemas.microsoft.com/office/powerpoint/2010/main">
+  <p:transition>
     <p:fade/>
   </p:transition>
 </p:sldLayout>
@@ -17293,7 +17293,7 @@
           </a:ln>
           <a:extLst>
             <a:ext uri="{91240B29-F687-4f45-9708-019B960494DF}">
-              <a14:hiddenLine xmlns:a14="http://schemas.microsoft.com/office/drawing/2010/main" w="9525">
+              <a14:hiddenLine xmlns:a14="http://schemas.microsoft.com/office/drawing/2010/main" xmlns="" w="9525">
                 <a:solidFill>
                   <a:srgbClr val="000000"/>
                 </a:solidFill>
@@ -17331,7 +17331,7 @@
   <p:clrMapOvr>
     <a:masterClrMapping/>
   </p:clrMapOvr>
-  <p:transition xmlns:p14="http://schemas.microsoft.com/office/powerpoint/2010/main">
+  <p:transition>
     <p:fade/>
   </p:transition>
 </p:sldLayout>
@@ -18932,7 +18932,7 @@
   <p:clrMapOvr>
     <a:masterClrMapping/>
   </p:clrMapOvr>
-  <p:transition xmlns:p14="http://schemas.microsoft.com/office/powerpoint/2010/main">
+  <p:transition>
     <p:fade/>
   </p:transition>
 </p:sldLayout>
@@ -19561,7 +19561,7 @@
   <p:clrMapOvr>
     <a:masterClrMapping/>
   </p:clrMapOvr>
-  <p:transition xmlns:p14="http://schemas.microsoft.com/office/powerpoint/2010/main">
+  <p:transition>
     <p:fade/>
   </p:transition>
 </p:sldLayout>
@@ -19868,7 +19868,7 @@
             </a:ln>
             <a:extLst>
               <a:ext uri="{91240B29-F687-4f45-9708-019B960494DF}">
-                <a14:hiddenLine xmlns:a14="http://schemas.microsoft.com/office/drawing/2010/main" w="9525">
+                <a14:hiddenLine xmlns:a14="http://schemas.microsoft.com/office/drawing/2010/main" xmlns="" w="9525">
                   <a:solidFill>
                     <a:srgbClr val="000000"/>
                   </a:solidFill>
@@ -20447,7 +20447,7 @@
             </a:ln>
             <a:extLst>
               <a:ext uri="{91240B29-F687-4f45-9708-019B960494DF}">
-                <a14:hiddenLine xmlns:a14="http://schemas.microsoft.com/office/drawing/2010/main" w="9525">
+                <a14:hiddenLine xmlns:a14="http://schemas.microsoft.com/office/drawing/2010/main" xmlns="" w="9525">
                   <a:solidFill>
                     <a:srgbClr val="000000"/>
                   </a:solidFill>
@@ -20486,7 +20486,7 @@
   <p:clrMapOvr>
     <a:masterClrMapping/>
   </p:clrMapOvr>
-  <p:transition xmlns:p14="http://schemas.microsoft.com/office/powerpoint/2010/main">
+  <p:transition>
     <p:fade/>
   </p:transition>
 </p:sldLayout>
@@ -20623,7 +20623,7 @@
   <p:clrMapOvr>
     <a:masterClrMapping/>
   </p:clrMapOvr>
-  <p:transition xmlns:p14="http://schemas.microsoft.com/office/powerpoint/2010/main">
+  <p:transition>
     <p:fade/>
   </p:transition>
 </p:sldLayout>
@@ -21889,7 +21889,7 @@
             </a:ln>
             <a:extLst>
               <a:ext uri="{91240B29-F687-4f45-9708-019B960494DF}">
-                <a14:hiddenLine xmlns:a14="http://schemas.microsoft.com/office/drawing/2010/main" w="9525">
+                <a14:hiddenLine xmlns:a14="http://schemas.microsoft.com/office/drawing/2010/main" xmlns="" w="9525">
                   <a:solidFill>
                     <a:srgbClr val="000000"/>
                   </a:solidFill>
@@ -21940,7 +21940,7 @@
             </a:ln>
             <a:extLst>
               <a:ext uri="{91240B29-F687-4f45-9708-019B960494DF}">
-                <a14:hiddenLine xmlns:a14="http://schemas.microsoft.com/office/drawing/2010/main" w="9525">
+                <a14:hiddenLine xmlns:a14="http://schemas.microsoft.com/office/drawing/2010/main" xmlns="" w="9525">
                   <a:solidFill>
                     <a:srgbClr val="000000"/>
                   </a:solidFill>
@@ -21991,7 +21991,7 @@
             </a:ln>
             <a:extLst>
               <a:ext uri="{91240B29-F687-4f45-9708-019B960494DF}">
-                <a14:hiddenLine xmlns:a14="http://schemas.microsoft.com/office/drawing/2010/main" w="9525">
+                <a14:hiddenLine xmlns:a14="http://schemas.microsoft.com/office/drawing/2010/main" xmlns="" w="9525">
                   <a:solidFill>
                     <a:srgbClr val="000000"/>
                   </a:solidFill>
@@ -22042,7 +22042,7 @@
             </a:ln>
             <a:extLst>
               <a:ext uri="{91240B29-F687-4f45-9708-019B960494DF}">
-                <a14:hiddenLine xmlns:a14="http://schemas.microsoft.com/office/drawing/2010/main" w="9525">
+                <a14:hiddenLine xmlns:a14="http://schemas.microsoft.com/office/drawing/2010/main" xmlns="" w="9525">
                   <a:solidFill>
                     <a:srgbClr val="000000"/>
                   </a:solidFill>
@@ -22093,7 +22093,7 @@
             </a:ln>
             <a:extLst>
               <a:ext uri="{91240B29-F687-4f45-9708-019B960494DF}">
-                <a14:hiddenLine xmlns:a14="http://schemas.microsoft.com/office/drawing/2010/main" w="9525">
+                <a14:hiddenLine xmlns:a14="http://schemas.microsoft.com/office/drawing/2010/main" xmlns="" w="9525">
                   <a:solidFill>
                     <a:srgbClr val="000000"/>
                   </a:solidFill>
@@ -22240,7 +22240,7 @@
   <p:clrMapOvr>
     <a:overrideClrMapping bg1="lt1" tx1="dk1" bg2="lt2" tx2="dk2" accent1="accent1" accent2="accent2" accent3="accent3" accent4="accent4" accent5="accent5" accent6="accent6" hlink="hlink" folHlink="folHlink"/>
   </p:clrMapOvr>
-  <p:transition xmlns:p14="http://schemas.microsoft.com/office/powerpoint/2010/main">
+  <p:transition>
     <p:fade/>
   </p:transition>
 </p:sldLayout>
@@ -22493,7 +22493,7 @@
   <p:clrMapOvr>
     <a:masterClrMapping/>
   </p:clrMapOvr>
-  <p:transition xmlns:p14="http://schemas.microsoft.com/office/powerpoint/2010/main">
+  <p:transition>
     <p:fade/>
   </p:transition>
 </p:sldLayout>
@@ -22799,7 +22799,7 @@
   <p:clrMapOvr>
     <a:masterClrMapping/>
   </p:clrMapOvr>
-  <p:transition xmlns:p14="http://schemas.microsoft.com/office/powerpoint/2010/main">
+  <p:transition>
     <p:fade/>
   </p:transition>
 </p:sldLayout>
@@ -23256,7 +23256,7 @@
   <p:clrMapOvr>
     <a:masterClrMapping/>
   </p:clrMapOvr>
-  <p:transition xmlns:p14="http://schemas.microsoft.com/office/powerpoint/2010/main">
+  <p:transition>
     <p:fade/>
   </p:transition>
 </p:sldLayout>
@@ -23471,7 +23471,7 @@
   <p:clrMapOvr>
     <a:masterClrMapping/>
   </p:clrMapOvr>
-  <p:transition xmlns:p14="http://schemas.microsoft.com/office/powerpoint/2010/main">
+  <p:transition>
     <p:fade/>
   </p:transition>
 </p:sldLayout>
@@ -24109,7 +24109,7 @@
   <p:clrMapOvr>
     <a:masterClrMapping/>
   </p:clrMapOvr>
-  <p:transition xmlns:p14="http://schemas.microsoft.com/office/powerpoint/2010/main">
+  <p:transition>
     <p:fade/>
   </p:transition>
 </p:sldLayout>
@@ -24304,7 +24304,7 @@
   <p:clrMapOvr>
     <a:masterClrMapping/>
   </p:clrMapOvr>
-  <p:transition xmlns:p14="http://schemas.microsoft.com/office/powerpoint/2010/main">
+  <p:transition>
     <p:fade/>
   </p:transition>
 </p:sldLayout>
@@ -24457,7 +24457,7 @@
   <p:clrMapOvr>
     <a:masterClrMapping/>
   </p:clrMapOvr>
-  <p:transition xmlns:p14="http://schemas.microsoft.com/office/powerpoint/2010/main">
+  <p:transition>
     <p:fade/>
   </p:transition>
 </p:sldLayout>
@@ -24824,7 +24824,7 @@
   <p:clrMapOvr>
     <a:masterClrMapping/>
   </p:clrMapOvr>
-  <p:transition xmlns:p14="http://schemas.microsoft.com/office/powerpoint/2010/main">
+  <p:transition>
     <p:fade/>
   </p:transition>
 </p:sldLayout>
@@ -25281,7 +25281,7 @@
   <p:clrMapOvr>
     <a:masterClrMapping/>
   </p:clrMapOvr>
-  <p:transition xmlns:p14="http://schemas.microsoft.com/office/powerpoint/2010/main">
+  <p:transition>
     <p:fade/>
   </p:transition>
 </p:sldLayout>
@@ -25844,7 +25844,7 @@
   <p:clrMapOvr>
     <a:masterClrMapping/>
   </p:clrMapOvr>
-  <p:transition xmlns:p14="http://schemas.microsoft.com/office/powerpoint/2010/main">
+  <p:transition>
     <p:fade/>
   </p:transition>
 </p:sldLayout>
@@ -25946,7 +25946,7 @@
   <p:clrMapOvr>
     <a:masterClrMapping/>
   </p:clrMapOvr>
-  <p:transition xmlns:p14="http://schemas.microsoft.com/office/powerpoint/2010/main">
+  <p:transition>
     <p:fade/>
   </p:transition>
 </p:sldLayout>
@@ -26016,7 +26016,7 @@
   <p:clrMapOvr>
     <a:masterClrMapping/>
   </p:clrMapOvr>
-  <p:transition xmlns:p14="http://schemas.microsoft.com/office/powerpoint/2010/main">
+  <p:transition>
     <p:fade/>
   </p:transition>
 </p:sldLayout>
@@ -26579,7 +26579,7 @@
   <p:clrMapOvr>
     <a:masterClrMapping/>
   </p:clrMapOvr>
-  <p:transition xmlns:p14="http://schemas.microsoft.com/office/powerpoint/2010/main">
+  <p:transition>
     <p:fade/>
   </p:transition>
 </p:sldLayout>
@@ -26612,7 +26612,7 @@
   <p:clrMapOvr>
     <a:masterClrMapping/>
   </p:clrMapOvr>
-  <p:transition xmlns:p14="http://schemas.microsoft.com/office/powerpoint/2010/main">
+  <p:transition>
     <p:fade/>
   </p:transition>
 </p:sldLayout>
@@ -27208,7 +27208,7 @@
   <p:clrMapOvr>
     <a:masterClrMapping/>
   </p:clrMapOvr>
-  <p:transition xmlns:p14="http://schemas.microsoft.com/office/powerpoint/2010/main">
+  <p:transition>
     <p:fade/>
   </p:transition>
 </p:sldLayout>
@@ -27831,7 +27831,7 @@
   <p:clrMapOvr>
     <a:masterClrMapping/>
   </p:clrMapOvr>
-  <p:transition xmlns:p14="http://schemas.microsoft.com/office/powerpoint/2010/main">
+  <p:transition>
     <p:fade/>
   </p:transition>
 </p:sldLayout>
@@ -28379,7 +28379,7 @@
           </a:ln>
           <a:extLst>
             <a:ext uri="{91240B29-F687-4f45-9708-019B960494DF}">
-              <a14:hiddenLine xmlns:a14="http://schemas.microsoft.com/office/drawing/2010/main" w="9525">
+              <a14:hiddenLine xmlns:a14="http://schemas.microsoft.com/office/drawing/2010/main" xmlns="" w="9525">
                 <a:solidFill>
                   <a:srgbClr val="000000"/>
                 </a:solidFill>
@@ -28418,7 +28418,7 @@
   <p:clrMapOvr>
     <a:masterClrMapping/>
   </p:clrMapOvr>
-  <p:transition xmlns:p14="http://schemas.microsoft.com/office/powerpoint/2010/main">
+  <p:transition>
     <p:fade/>
   </p:transition>
 </p:sldLayout>
@@ -30024,7 +30024,7 @@
   <p:clrMapOvr>
     <a:masterClrMapping/>
   </p:clrMapOvr>
-  <p:transition xmlns:p14="http://schemas.microsoft.com/office/powerpoint/2010/main">
+  <p:transition>
     <p:fade/>
   </p:transition>
 </p:sldLayout>
@@ -30654,7 +30654,7 @@
   <p:clrMapOvr>
     <a:masterClrMapping/>
   </p:clrMapOvr>
-  <p:transition xmlns:p14="http://schemas.microsoft.com/office/powerpoint/2010/main">
+  <p:transition>
     <p:fade/>
   </p:transition>
 </p:sldLayout>
@@ -30961,7 +30961,7 @@
             </a:ln>
             <a:extLst>
               <a:ext uri="{91240B29-F687-4f45-9708-019B960494DF}">
-                <a14:hiddenLine xmlns:a14="http://schemas.microsoft.com/office/drawing/2010/main" w="9525">
+                <a14:hiddenLine xmlns:a14="http://schemas.microsoft.com/office/drawing/2010/main" xmlns="" w="9525">
                   <a:solidFill>
                     <a:srgbClr val="000000"/>
                   </a:solidFill>
@@ -31541,7 +31541,7 @@
             </a:ln>
             <a:extLst>
               <a:ext uri="{91240B29-F687-4f45-9708-019B960494DF}">
-                <a14:hiddenLine xmlns:a14="http://schemas.microsoft.com/office/drawing/2010/main" w="9525">
+                <a14:hiddenLine xmlns:a14="http://schemas.microsoft.com/office/drawing/2010/main" xmlns="" w="9525">
                   <a:solidFill>
                     <a:srgbClr val="000000"/>
                   </a:solidFill>
@@ -31581,7 +31581,7 @@
   <p:clrMapOvr>
     <a:masterClrMapping/>
   </p:clrMapOvr>
-  <p:transition xmlns:p14="http://schemas.microsoft.com/office/powerpoint/2010/main">
+  <p:transition>
     <p:fade/>
   </p:transition>
 </p:sldLayout>
@@ -31718,7 +31718,7 @@
   <p:clrMapOvr>
     <a:masterClrMapping/>
   </p:clrMapOvr>
-  <p:transition xmlns:p14="http://schemas.microsoft.com/office/powerpoint/2010/main">
+  <p:transition>
     <p:fade/>
   </p:transition>
 </p:sldLayout>
@@ -32984,7 +32984,7 @@
             </a:ln>
             <a:extLst>
               <a:ext uri="{91240B29-F687-4f45-9708-019B960494DF}">
-                <a14:hiddenLine xmlns:a14="http://schemas.microsoft.com/office/drawing/2010/main" w="9525">
+                <a14:hiddenLine xmlns:a14="http://schemas.microsoft.com/office/drawing/2010/main" xmlns="" w="9525">
                   <a:solidFill>
                     <a:srgbClr val="000000"/>
                   </a:solidFill>
@@ -33036,7 +33036,7 @@
             </a:ln>
             <a:extLst>
               <a:ext uri="{91240B29-F687-4f45-9708-019B960494DF}">
-                <a14:hiddenLine xmlns:a14="http://schemas.microsoft.com/office/drawing/2010/main" w="9525">
+                <a14:hiddenLine xmlns:a14="http://schemas.microsoft.com/office/drawing/2010/main" xmlns="" w="9525">
                   <a:solidFill>
                     <a:srgbClr val="000000"/>
                   </a:solidFill>
@@ -33088,7 +33088,7 @@
             </a:ln>
             <a:extLst>
               <a:ext uri="{91240B29-F687-4f45-9708-019B960494DF}">
-                <a14:hiddenLine xmlns:a14="http://schemas.microsoft.com/office/drawing/2010/main" w="9525">
+                <a14:hiddenLine xmlns:a14="http://schemas.microsoft.com/office/drawing/2010/main" xmlns="" w="9525">
                   <a:solidFill>
                     <a:srgbClr val="000000"/>
                   </a:solidFill>
@@ -33140,7 +33140,7 @@
             </a:ln>
             <a:extLst>
               <a:ext uri="{91240B29-F687-4f45-9708-019B960494DF}">
-                <a14:hiddenLine xmlns:a14="http://schemas.microsoft.com/office/drawing/2010/main" w="9525">
+                <a14:hiddenLine xmlns:a14="http://schemas.microsoft.com/office/drawing/2010/main" xmlns="" w="9525">
                   <a:solidFill>
                     <a:srgbClr val="000000"/>
                   </a:solidFill>
@@ -33192,7 +33192,7 @@
             </a:ln>
             <a:extLst>
               <a:ext uri="{91240B29-F687-4f45-9708-019B960494DF}">
-                <a14:hiddenLine xmlns:a14="http://schemas.microsoft.com/office/drawing/2010/main" w="9525">
+                <a14:hiddenLine xmlns:a14="http://schemas.microsoft.com/office/drawing/2010/main" xmlns="" w="9525">
                   <a:solidFill>
                     <a:srgbClr val="000000"/>
                   </a:solidFill>
@@ -33344,7 +33344,7 @@
   <p:clrMapOvr>
     <a:overrideClrMapping bg1="lt1" tx1="dk1" bg2="lt2" tx2="dk2" accent1="accent1" accent2="accent2" accent3="accent3" accent4="accent4" accent5="accent5" accent6="accent6" hlink="hlink" folHlink="folHlink"/>
   </p:clrMapOvr>
-  <p:transition xmlns:p14="http://schemas.microsoft.com/office/powerpoint/2010/main">
+  <p:transition>
     <p:fade/>
   </p:transition>
 </p:sldLayout>
@@ -33597,7 +33597,7 @@
   <p:clrMapOvr>
     <a:masterClrMapping/>
   </p:clrMapOvr>
-  <p:transition xmlns:p14="http://schemas.microsoft.com/office/powerpoint/2010/main">
+  <p:transition>
     <p:fade/>
   </p:transition>
 </p:sldLayout>
@@ -33699,7 +33699,7 @@
   <p:clrMapOvr>
     <a:masterClrMapping/>
   </p:clrMapOvr>
-  <p:transition xmlns:p14="http://schemas.microsoft.com/office/powerpoint/2010/main">
+  <p:transition>
     <p:fade/>
   </p:transition>
 </p:sldLayout>
@@ -34005,7 +34005,7 @@
   <p:clrMapOvr>
     <a:masterClrMapping/>
   </p:clrMapOvr>
-  <p:transition xmlns:p14="http://schemas.microsoft.com/office/powerpoint/2010/main">
+  <p:transition>
     <p:fade/>
   </p:transition>
 </p:sldLayout>
@@ -34220,7 +34220,7 @@
   <p:clrMapOvr>
     <a:masterClrMapping/>
   </p:clrMapOvr>
-  <p:transition xmlns:p14="http://schemas.microsoft.com/office/powerpoint/2010/main">
+  <p:transition>
     <p:fade/>
   </p:transition>
 </p:sldLayout>
@@ -34878,7 +34878,7 @@
   <p:clrMapOvr>
     <a:masterClrMapping/>
   </p:clrMapOvr>
-  <p:transition xmlns:p14="http://schemas.microsoft.com/office/powerpoint/2010/main">
+  <p:transition>
     <p:fade/>
   </p:transition>
 </p:sldLayout>
@@ -34999,7 +34999,7 @@
                 <a:latin typeface="Segoe UI"/>
               </a:rPr>
               <a:pPr/>
-              <a:t>7/1/16</a:t>
+              <a:t>12/20/16</a:t>
             </a:fld>
             <a:endParaRPr lang="en-US">
               <a:solidFill>
@@ -35409,7 +35409,7 @@
           <a:p>
             <a:fld id="{0459C166-16D3-4A25-A2F8-C51E0E346B22}" type="datetimeFigureOut">
               <a:rPr lang="en-US" smtClean="0"/>
-              <a:t>7/1/16</a:t>
+              <a:t>12/20/16</a:t>
             </a:fld>
             <a:endParaRPr lang="en-US"/>
           </a:p>
@@ -35579,7 +35579,7 @@
           <a:p>
             <a:fld id="{0459C166-16D3-4A25-A2F8-C51E0E346B22}" type="datetimeFigureOut">
               <a:rPr lang="en-US" smtClean="0"/>
-              <a:t>7/1/16</a:t>
+              <a:t>12/20/16</a:t>
             </a:fld>
             <a:endParaRPr lang="en-US"/>
           </a:p>
@@ -35849,7 +35849,7 @@
                 <a:latin typeface="Segoe UI"/>
               </a:rPr>
               <a:pPr/>
-              <a:t>7/1/16</a:t>
+              <a:t>12/20/16</a:t>
             </a:fld>
             <a:endParaRPr lang="en-US">
               <a:solidFill>
@@ -36195,7 +36195,7 @@
   <p:clrMapOvr>
     <a:masterClrMapping/>
   </p:clrMapOvr>
-  <p:transition xmlns:p14="http://schemas.microsoft.com/office/powerpoint/2010/main">
+  <p:transition>
     <p:fade/>
   </p:transition>
 </p:sldLayout>
@@ -36266,7 +36266,7 @@
                 <a:latin typeface="Segoe UI"/>
               </a:rPr>
               <a:pPr/>
-              <a:t>7/1/16</a:t>
+              <a:t>12/20/16</a:t>
             </a:fld>
             <a:endParaRPr lang="en-US">
               <a:solidFill>
@@ -36700,7 +36700,7 @@
                 <a:latin typeface="Segoe UI"/>
               </a:rPr>
               <a:pPr/>
-              <a:t>7/1/16</a:t>
+              <a:t>12/20/16</a:t>
             </a:fld>
             <a:endParaRPr lang="en-US">
               <a:solidFill>
@@ -37699,7 +37699,7 @@
           <a:p>
             <a:fld id="{0459C166-16D3-4A25-A2F8-C51E0E346B22}" type="datetimeFigureOut">
               <a:rPr lang="en-US" smtClean="0"/>
-              <a:t>7/1/16</a:t>
+              <a:t>12/20/16</a:t>
             </a:fld>
             <a:endParaRPr lang="en-US"/>
           </a:p>
@@ -38066,7 +38066,7 @@
           <a:p>
             <a:fld id="{0459C166-16D3-4A25-A2F8-C51E0E346B22}" type="datetimeFigureOut">
               <a:rPr lang="en-US" smtClean="0"/>
-              <a:t>7/1/16</a:t>
+              <a:t>12/20/16</a:t>
             </a:fld>
             <a:endParaRPr lang="en-US"/>
           </a:p>
@@ -38184,7 +38184,7 @@
           <a:p>
             <a:fld id="{0459C166-16D3-4A25-A2F8-C51E0E346B22}" type="datetimeFigureOut">
               <a:rPr lang="en-US" smtClean="0"/>
-              <a:t>7/1/16</a:t>
+              <a:t>12/20/16</a:t>
             </a:fld>
             <a:endParaRPr lang="en-US"/>
           </a:p>
@@ -38491,7 +38491,7 @@
                 <a:latin typeface="Segoe UI"/>
               </a:rPr>
               <a:pPr/>
-              <a:t>7/1/16</a:t>
+              <a:t>12/20/16</a:t>
             </a:fld>
             <a:endParaRPr lang="en-US">
               <a:solidFill>
@@ -38866,7 +38866,7 @@
                 <a:latin typeface="Segoe UI"/>
               </a:rPr>
               <a:pPr/>
-              <a:t>7/1/16</a:t>
+              <a:t>12/20/16</a:t>
             </a:fld>
             <a:endParaRPr lang="en-US">
               <a:solidFill>
@@ -39203,7 +39203,7 @@
   <p:clrMapOvr>
     <a:masterClrMapping/>
   </p:clrMapOvr>
-  <p:transition xmlns:p14="http://schemas.microsoft.com/office/powerpoint/2010/main">
+  <p:transition>
     <p:fade/>
   </p:transition>
 </p:sldLayout>
@@ -39913,7 +39913,7 @@
                 <a:latin typeface="Segoe UI"/>
               </a:rPr>
               <a:pPr/>
-              <a:t>7/1/16</a:t>
+              <a:t>12/20/16</a:t>
             </a:fld>
             <a:endParaRPr lang="en-US">
               <a:solidFill>
@@ -40288,7 +40288,7 @@
                 <a:latin typeface="Segoe UI"/>
               </a:rPr>
               <a:pPr/>
-              <a:t>7/1/16</a:t>
+              <a:t>12/20/16</a:t>
             </a:fld>
             <a:endParaRPr lang="en-US">
               <a:solidFill>
@@ -41302,7 +41302,7 @@
                 <a:latin typeface="Segoe UI"/>
               </a:rPr>
               <a:pPr/>
-              <a:t>7/1/16</a:t>
+              <a:t>12/20/16</a:t>
             </a:fld>
             <a:endParaRPr lang="en-US">
               <a:solidFill>
@@ -41677,7 +41677,7 @@
                 <a:latin typeface="Segoe UI"/>
               </a:rPr>
               <a:pPr/>
-              <a:t>7/1/16</a:t>
+              <a:t>12/20/16</a:t>
             </a:fld>
             <a:endParaRPr lang="en-US">
               <a:solidFill>
@@ -42575,7 +42575,7 @@
   <p:clrMapOvr>
     <a:masterClrMapping/>
   </p:clrMapOvr>
-  <p:transition xmlns:p14="http://schemas.microsoft.com/office/powerpoint/2010/main">
+  <p:transition>
     <p:fade/>
   </p:transition>
 </p:sldLayout>
@@ -43227,7 +43227,7 @@
     <p:sldLayoutId id="2147483700" r:id="rId20"/>
     <p:sldLayoutId id="2147483701" r:id="rId21"/>
   </p:sldLayoutIdLst>
-  <p:transition xmlns:p14="http://schemas.microsoft.com/office/powerpoint/2010/main">
+  <p:transition>
     <p:fade/>
   </p:transition>
   <p:txStyles>
@@ -43710,7 +43710,7 @@
     <p:sldLayoutId id="2147483725" r:id="rId20"/>
     <p:sldLayoutId id="2147483726" r:id="rId21"/>
   </p:sldLayoutIdLst>
-  <p:transition xmlns:p14="http://schemas.microsoft.com/office/powerpoint/2010/main">
+  <p:transition>
     <p:fade/>
   </p:transition>
   <p:txStyles>
@@ -44195,7 +44195,7 @@
     <p:sldLayoutId id="2147483812" r:id="rId22"/>
     <p:sldLayoutId id="2147483813" r:id="rId23"/>
   </p:sldLayoutIdLst>
-  <p:transition xmlns:p14="http://schemas.microsoft.com/office/powerpoint/2010/main">
+  <p:transition>
     <p:fade/>
   </p:transition>
   <p:txStyles>
@@ -44678,7 +44678,7 @@
           <a:p>
             <a:fld id="{0459C166-16D3-4A25-A2F8-C51E0E346B22}" type="datetimeFigureOut">
               <a:rPr lang="en-US" smtClean="0"/>
-              <a:t>7/1/16</a:t>
+              <a:t>12/20/16</a:t>
             </a:fld>
             <a:endParaRPr lang="en-US"/>
           </a:p>
@@ -45157,20 +45157,33 @@
                   <a:srgbClr val="FFFF00"/>
                 </a:solidFill>
               </a:rPr>
-              <a:t>, Lesson </a:t>
+              <a:t>, </a:t>
+            </a:r>
+            <a:r>
+              <a:rPr lang="en-US" sz="4000">
+                <a:solidFill>
+                  <a:srgbClr val="FFFF00"/>
+                </a:solidFill>
+              </a:rPr>
+              <a:t>Lesson </a:t>
             </a:r>
             <a:r>
               <a:rPr lang="en-US" dirty="0"/>
-              <a:t>5</a:t>
-            </a:r>
-            <a:r>
-              <a:rPr lang="en-US" sz="4000" dirty="0">
+              <a:t>6</a:t>
+            </a:r>
+            <a:r>
+              <a:rPr lang="en-US" sz="4000" smtClean="0">
                 <a:solidFill>
                   <a:srgbClr val="FFFF00"/>
                 </a:solidFill>
               </a:rPr>
               <a:t>: </a:t>
             </a:r>
+            <a:endParaRPr lang="en-US" sz="4000" dirty="0">
+              <a:solidFill>
+                <a:srgbClr val="FFFF00"/>
+              </a:solidFill>
+            </a:endParaRPr>
           </a:p>
           <a:p>
             <a:r>
@@ -45282,21 +45295,21 @@
                 <a:gridCol w="2487584">
                   <a:extLst>
                     <a:ext uri="{9D8B030D-6E8A-4147-A177-3AD203B41FA5}">
-                      <a16:colId xmlns:a16="http://schemas.microsoft.com/office/drawing/2014/main" xmlns="" val="48614039"/>
+                      <a16:colId xmlns="" xmlns:a16="http://schemas.microsoft.com/office/drawing/2014/main" val="48614039"/>
                     </a:ext>
                   </a:extLst>
                 </a:gridCol>
                 <a:gridCol w="4099977">
                   <a:extLst>
                     <a:ext uri="{9D8B030D-6E8A-4147-A177-3AD203B41FA5}">
-                      <a16:colId xmlns:a16="http://schemas.microsoft.com/office/drawing/2014/main" xmlns="" val="20001"/>
+                      <a16:colId xmlns="" xmlns:a16="http://schemas.microsoft.com/office/drawing/2014/main" val="20001"/>
                     </a:ext>
                   </a:extLst>
                 </a:gridCol>
                 <a:gridCol w="4099977">
                   <a:extLst>
                     <a:ext uri="{9D8B030D-6E8A-4147-A177-3AD203B41FA5}">
-                      <a16:colId xmlns:a16="http://schemas.microsoft.com/office/drawing/2014/main" xmlns="" val="20002"/>
+                      <a16:colId xmlns="" xmlns:a16="http://schemas.microsoft.com/office/drawing/2014/main" val="20002"/>
                     </a:ext>
                   </a:extLst>
                 </a:gridCol>
@@ -45370,7 +45383,7 @@
                 </a:tc>
                 <a:extLst>
                   <a:ext uri="{0D108BD9-81ED-4DB2-BD59-A6C34878D82A}">
-                    <a16:rowId xmlns:a16="http://schemas.microsoft.com/office/drawing/2014/main" xmlns="" val="679667022"/>
+                    <a16:rowId xmlns="" xmlns:a16="http://schemas.microsoft.com/office/drawing/2014/main" val="679667022"/>
                   </a:ext>
                 </a:extLst>
               </a:tr>
@@ -45442,7 +45455,7 @@
                 </a:tc>
                 <a:extLst>
                   <a:ext uri="{0D108BD9-81ED-4DB2-BD59-A6C34878D82A}">
-                    <a16:rowId xmlns:a16="http://schemas.microsoft.com/office/drawing/2014/main" xmlns="" val="2034482246"/>
+                    <a16:rowId xmlns="" xmlns:a16="http://schemas.microsoft.com/office/drawing/2014/main" val="2034482246"/>
                   </a:ext>
                 </a:extLst>
               </a:tr>
@@ -45508,7 +45521,7 @@
                 </a:tc>
                 <a:extLst>
                   <a:ext uri="{0D108BD9-81ED-4DB2-BD59-A6C34878D82A}">
-                    <a16:rowId xmlns:a16="http://schemas.microsoft.com/office/drawing/2014/main" xmlns="" val="682465758"/>
+                    <a16:rowId xmlns="" xmlns:a16="http://schemas.microsoft.com/office/drawing/2014/main" val="682465758"/>
                   </a:ext>
                 </a:extLst>
               </a:tr>
@@ -45579,7 +45592,7 @@
                 </a:tc>
                 <a:extLst>
                   <a:ext uri="{0D108BD9-81ED-4DB2-BD59-A6C34878D82A}">
-                    <a16:rowId xmlns:a16="http://schemas.microsoft.com/office/drawing/2014/main" xmlns="" val="4230228483"/>
+                    <a16:rowId xmlns="" xmlns:a16="http://schemas.microsoft.com/office/drawing/2014/main" val="4230228483"/>
                   </a:ext>
                 </a:extLst>
               </a:tr>
@@ -45659,7 +45672,7 @@
                 </a:tc>
                 <a:extLst>
                   <a:ext uri="{0D108BD9-81ED-4DB2-BD59-A6C34878D82A}">
-                    <a16:rowId xmlns:a16="http://schemas.microsoft.com/office/drawing/2014/main" xmlns="" val="3329658239"/>
+                    <a16:rowId xmlns="" xmlns:a16="http://schemas.microsoft.com/office/drawing/2014/main" val="3329658239"/>
                   </a:ext>
                 </a:extLst>
               </a:tr>
@@ -45741,7 +45754,7 @@
                 </a:tc>
                 <a:extLst>
                   <a:ext uri="{0D108BD9-81ED-4DB2-BD59-A6C34878D82A}">
-                    <a16:rowId xmlns:a16="http://schemas.microsoft.com/office/drawing/2014/main" xmlns="" val="10005"/>
+                    <a16:rowId xmlns="" xmlns:a16="http://schemas.microsoft.com/office/drawing/2014/main" val="10005"/>
                   </a:ext>
                 </a:extLst>
               </a:tr>
@@ -47904,7 +47917,7 @@
   <p:clrMapOvr>
     <a:masterClrMapping/>
   </p:clrMapOvr>
-  <p:transition xmlns:p14="http://schemas.microsoft.com/office/powerpoint/2010/main">
+  <p:transition>
     <p:fade/>
   </p:transition>
 </p:sld>
@@ -49993,14 +50006,14 @@
                 <a:gridCol w="4065308">
                   <a:extLst>
                     <a:ext uri="{9D8B030D-6E8A-4147-A177-3AD203B41FA5}">
-                      <a16:colId xmlns:a16="http://schemas.microsoft.com/office/drawing/2014/main" xmlns="" val="48614039"/>
+                      <a16:colId xmlns="" xmlns:a16="http://schemas.microsoft.com/office/drawing/2014/main" val="48614039"/>
                     </a:ext>
                   </a:extLst>
                 </a:gridCol>
                 <a:gridCol w="6700344">
                   <a:extLst>
                     <a:ext uri="{9D8B030D-6E8A-4147-A177-3AD203B41FA5}">
-                      <a16:colId xmlns:a16="http://schemas.microsoft.com/office/drawing/2014/main" xmlns="" val="20001"/>
+                      <a16:colId xmlns="" xmlns:a16="http://schemas.microsoft.com/office/drawing/2014/main" val="20001"/>
                     </a:ext>
                   </a:extLst>
                 </a:gridCol>
@@ -50052,7 +50065,7 @@
                 </a:tc>
                 <a:extLst>
                   <a:ext uri="{0D108BD9-81ED-4DB2-BD59-A6C34878D82A}">
-                    <a16:rowId xmlns:a16="http://schemas.microsoft.com/office/drawing/2014/main" xmlns="" val="679667022"/>
+                    <a16:rowId xmlns="" xmlns:a16="http://schemas.microsoft.com/office/drawing/2014/main" val="679667022"/>
                   </a:ext>
                 </a:extLst>
               </a:tr>
@@ -50115,7 +50128,7 @@
                 </a:tc>
                 <a:extLst>
                   <a:ext uri="{0D108BD9-81ED-4DB2-BD59-A6C34878D82A}">
-                    <a16:rowId xmlns:a16="http://schemas.microsoft.com/office/drawing/2014/main" xmlns="" val="2034482246"/>
+                    <a16:rowId xmlns="" xmlns:a16="http://schemas.microsoft.com/office/drawing/2014/main" val="2034482246"/>
                   </a:ext>
                 </a:extLst>
               </a:tr>
@@ -50162,7 +50175,7 @@
                 </a:tc>
                 <a:extLst>
                   <a:ext uri="{0D108BD9-81ED-4DB2-BD59-A6C34878D82A}">
-                    <a16:rowId xmlns:a16="http://schemas.microsoft.com/office/drawing/2014/main" xmlns="" val="682465758"/>
+                    <a16:rowId xmlns="" xmlns:a16="http://schemas.microsoft.com/office/drawing/2014/main" val="682465758"/>
                   </a:ext>
                 </a:extLst>
               </a:tr>
@@ -50210,7 +50223,7 @@
                 </a:tc>
                 <a:extLst>
                   <a:ext uri="{0D108BD9-81ED-4DB2-BD59-A6C34878D82A}">
-                    <a16:rowId xmlns:a16="http://schemas.microsoft.com/office/drawing/2014/main" xmlns="" val="4230228483"/>
+                    <a16:rowId xmlns="" xmlns:a16="http://schemas.microsoft.com/office/drawing/2014/main" val="4230228483"/>
                   </a:ext>
                 </a:extLst>
               </a:tr>
@@ -50262,7 +50275,7 @@
                 </a:tc>
                 <a:extLst>
                   <a:ext uri="{0D108BD9-81ED-4DB2-BD59-A6C34878D82A}">
-                    <a16:rowId xmlns:a16="http://schemas.microsoft.com/office/drawing/2014/main" xmlns="" val="3329658239"/>
+                    <a16:rowId xmlns="" xmlns:a16="http://schemas.microsoft.com/office/drawing/2014/main" val="3329658239"/>
                   </a:ext>
                 </a:extLst>
               </a:tr>
@@ -51375,14 +51388,14 @@
                 <a:gridCol w="4065308">
                   <a:extLst>
                     <a:ext uri="{9D8B030D-6E8A-4147-A177-3AD203B41FA5}">
-                      <a16:colId xmlns:a16="http://schemas.microsoft.com/office/drawing/2014/main" xmlns="" val="48614039"/>
+                      <a16:colId xmlns="" xmlns:a16="http://schemas.microsoft.com/office/drawing/2014/main" val="48614039"/>
                     </a:ext>
                   </a:extLst>
                 </a:gridCol>
                 <a:gridCol w="6700344">
                   <a:extLst>
                     <a:ext uri="{9D8B030D-6E8A-4147-A177-3AD203B41FA5}">
-                      <a16:colId xmlns:a16="http://schemas.microsoft.com/office/drawing/2014/main" xmlns="" val="20001"/>
+                      <a16:colId xmlns="" xmlns:a16="http://schemas.microsoft.com/office/drawing/2014/main" val="20001"/>
                     </a:ext>
                   </a:extLst>
                 </a:gridCol>
@@ -51434,7 +51447,7 @@
                 </a:tc>
                 <a:extLst>
                   <a:ext uri="{0D108BD9-81ED-4DB2-BD59-A6C34878D82A}">
-                    <a16:rowId xmlns:a16="http://schemas.microsoft.com/office/drawing/2014/main" xmlns="" val="679667022"/>
+                    <a16:rowId xmlns="" xmlns:a16="http://schemas.microsoft.com/office/drawing/2014/main" val="679667022"/>
                   </a:ext>
                 </a:extLst>
               </a:tr>
@@ -51501,7 +51514,7 @@
                 </a:tc>
                 <a:extLst>
                   <a:ext uri="{0D108BD9-81ED-4DB2-BD59-A6C34878D82A}">
-                    <a16:rowId xmlns:a16="http://schemas.microsoft.com/office/drawing/2014/main" xmlns="" val="2034482246"/>
+                    <a16:rowId xmlns="" xmlns:a16="http://schemas.microsoft.com/office/drawing/2014/main" val="2034482246"/>
                   </a:ext>
                 </a:extLst>
               </a:tr>
@@ -51553,7 +51566,7 @@
                 </a:tc>
                 <a:extLst>
                   <a:ext uri="{0D108BD9-81ED-4DB2-BD59-A6C34878D82A}">
-                    <a16:rowId xmlns:a16="http://schemas.microsoft.com/office/drawing/2014/main" xmlns="" val="682465758"/>
+                    <a16:rowId xmlns="" xmlns:a16="http://schemas.microsoft.com/office/drawing/2014/main" val="682465758"/>
                   </a:ext>
                 </a:extLst>
               </a:tr>
@@ -51605,7 +51618,7 @@
                 </a:tc>
                 <a:extLst>
                   <a:ext uri="{0D108BD9-81ED-4DB2-BD59-A6C34878D82A}">
-                    <a16:rowId xmlns:a16="http://schemas.microsoft.com/office/drawing/2014/main" xmlns="" val="4230228483"/>
+                    <a16:rowId xmlns="" xmlns:a16="http://schemas.microsoft.com/office/drawing/2014/main" val="4230228483"/>
                   </a:ext>
                 </a:extLst>
               </a:tr>
@@ -51657,7 +51670,7 @@
                 </a:tc>
                 <a:extLst>
                   <a:ext uri="{0D108BD9-81ED-4DB2-BD59-A6C34878D82A}">
-                    <a16:rowId xmlns:a16="http://schemas.microsoft.com/office/drawing/2014/main" xmlns="" val="3329658239"/>
+                    <a16:rowId xmlns="" xmlns:a16="http://schemas.microsoft.com/office/drawing/2014/main" val="3329658239"/>
                   </a:ext>
                 </a:extLst>
               </a:tr>
@@ -51708,7 +51721,7 @@
                 </a:tc>
                 <a:extLst>
                   <a:ext uri="{0D108BD9-81ED-4DB2-BD59-A6C34878D82A}">
-                    <a16:rowId xmlns:a16="http://schemas.microsoft.com/office/drawing/2014/main" xmlns="" val="10005"/>
+                    <a16:rowId xmlns="" xmlns:a16="http://schemas.microsoft.com/office/drawing/2014/main" val="10005"/>
                   </a:ext>
                 </a:extLst>
               </a:tr>
@@ -54024,14 +54037,14 @@
                 <a:gridCol w="4035811">
                   <a:extLst>
                     <a:ext uri="{9D8B030D-6E8A-4147-A177-3AD203B41FA5}">
-                      <a16:colId xmlns:a16="http://schemas.microsoft.com/office/drawing/2014/main" xmlns="" val="48614039"/>
+                      <a16:colId xmlns="" xmlns:a16="http://schemas.microsoft.com/office/drawing/2014/main" val="48614039"/>
                     </a:ext>
                   </a:extLst>
                 </a:gridCol>
                 <a:gridCol w="6651728">
                   <a:extLst>
                     <a:ext uri="{9D8B030D-6E8A-4147-A177-3AD203B41FA5}">
-                      <a16:colId xmlns:a16="http://schemas.microsoft.com/office/drawing/2014/main" xmlns="" val="20001"/>
+                      <a16:colId xmlns="" xmlns:a16="http://schemas.microsoft.com/office/drawing/2014/main" val="20001"/>
                     </a:ext>
                   </a:extLst>
                 </a:gridCol>
@@ -54083,7 +54096,7 @@
                 </a:tc>
                 <a:extLst>
                   <a:ext uri="{0D108BD9-81ED-4DB2-BD59-A6C34878D82A}">
-                    <a16:rowId xmlns:a16="http://schemas.microsoft.com/office/drawing/2014/main" xmlns="" val="679667022"/>
+                    <a16:rowId xmlns="" xmlns:a16="http://schemas.microsoft.com/office/drawing/2014/main" val="679667022"/>
                   </a:ext>
                 </a:extLst>
               </a:tr>
@@ -54140,7 +54153,7 @@
                 </a:tc>
                 <a:extLst>
                   <a:ext uri="{0D108BD9-81ED-4DB2-BD59-A6C34878D82A}">
-                    <a16:rowId xmlns:a16="http://schemas.microsoft.com/office/drawing/2014/main" xmlns="" val="2034482246"/>
+                    <a16:rowId xmlns="" xmlns:a16="http://schemas.microsoft.com/office/drawing/2014/main" val="2034482246"/>
                   </a:ext>
                 </a:extLst>
               </a:tr>
@@ -54202,7 +54215,7 @@
                 </a:tc>
                 <a:extLst>
                   <a:ext uri="{0D108BD9-81ED-4DB2-BD59-A6C34878D82A}">
-                    <a16:rowId xmlns:a16="http://schemas.microsoft.com/office/drawing/2014/main" xmlns="" val="682465758"/>
+                    <a16:rowId xmlns="" xmlns:a16="http://schemas.microsoft.com/office/drawing/2014/main" val="682465758"/>
                   </a:ext>
                 </a:extLst>
               </a:tr>
@@ -54249,7 +54262,7 @@
                 </a:tc>
                 <a:extLst>
                   <a:ext uri="{0D108BD9-81ED-4DB2-BD59-A6C34878D82A}">
-                    <a16:rowId xmlns:a16="http://schemas.microsoft.com/office/drawing/2014/main" xmlns="" val="4230228483"/>
+                    <a16:rowId xmlns="" xmlns:a16="http://schemas.microsoft.com/office/drawing/2014/main" val="4230228483"/>
                   </a:ext>
                 </a:extLst>
               </a:tr>
@@ -54295,7 +54308,7 @@
                 </a:tc>
                 <a:extLst>
                   <a:ext uri="{0D108BD9-81ED-4DB2-BD59-A6C34878D82A}">
-                    <a16:rowId xmlns:a16="http://schemas.microsoft.com/office/drawing/2014/main" xmlns="" val="3329658239"/>
+                    <a16:rowId xmlns="" xmlns:a16="http://schemas.microsoft.com/office/drawing/2014/main" val="3329658239"/>
                   </a:ext>
                 </a:extLst>
               </a:tr>
@@ -56311,7 +56324,7 @@
   <a:extraClrSchemeLst/>
   <a:extLst>
     <a:ext uri="{05A4C25C-085E-4340-85A3-A5531E510DB2}">
-      <thm15:themeFamily xmlns:thm15="http://schemas.microsoft.com/office/thememl/2012/main" xmlns="" name="Azure4ResearchTemplate" id="{DD1C6CE8-BDBA-0D4F-9930-3643ABC8EF0E}" vid="{B5C66FD7-0952-994B-96D6-AB3BB89097FE}"/>
+      <thm15:themeFamily xmlns:thm15="http://schemas.microsoft.com/office/thememl/2012/main" name="Azure4ResearchTemplate" id="{DD1C6CE8-BDBA-0D4F-9930-3643ABC8EF0E}" vid="{B5C66FD7-0952-994B-96D6-AB3BB89097FE}"/>
     </a:ext>
   </a:extLst>
 </a:theme>
@@ -56644,7 +56657,7 @@
   <a:extraClrSchemeLst/>
   <a:extLst>
     <a:ext uri="{05A4C25C-085E-4340-85A3-A5531E510DB2}">
-      <thm15:themeFamily xmlns:thm15="http://schemas.microsoft.com/office/thememl/2012/main" xmlns="" name="Azure4ResearchTemplate" id="{DD1C6CE8-BDBA-0D4F-9930-3643ABC8EF0E}" vid="{B5C66FD7-0952-994B-96D6-AB3BB89097FE}"/>
+      <thm15:themeFamily xmlns:thm15="http://schemas.microsoft.com/office/thememl/2012/main" name="Azure4ResearchTemplate" id="{DD1C6CE8-BDBA-0D4F-9930-3643ABC8EF0E}" vid="{B5C66FD7-0952-994B-96D6-AB3BB89097FE}"/>
     </a:ext>
   </a:extLst>
 </a:theme>
@@ -56977,7 +56990,7 @@
   <a:extraClrSchemeLst/>
   <a:extLst>
     <a:ext uri="{05A4C25C-085E-4340-85A3-A5531E510DB2}">
-      <thm15:themeFamily xmlns:thm15="http://schemas.microsoft.com/office/thememl/2012/main" xmlns="" name="Azure4ResearchTemplate" id="{DD1C6CE8-BDBA-0D4F-9930-3643ABC8EF0E}" vid="{B5C66FD7-0952-994B-96D6-AB3BB89097FE}"/>
+      <thm15:themeFamily xmlns:thm15="http://schemas.microsoft.com/office/thememl/2012/main" name="Azure4ResearchTemplate" id="{DD1C6CE8-BDBA-0D4F-9930-3643ABC8EF0E}" vid="{B5C66FD7-0952-994B-96D6-AB3BB89097FE}"/>
     </a:ext>
   </a:extLst>
 </a:theme>
@@ -57246,7 +57259,7 @@
   <a:extraClrSchemeLst/>
   <a:extLst>
     <a:ext uri="{05A4C25C-085E-4340-85A3-A5531E510DB2}">
-      <thm15:themeFamily xmlns:thm15="http://schemas.microsoft.com/office/thememl/2012/main" xmlns="" name="Office Theme" id="{62F939B6-93AF-4DB8-9C6B-D6C7DFDC589F}" vid="{4A3C46E8-61CC-4603-A589-7422A47A8E4A}"/>
+      <thm15:themeFamily xmlns:thm15="http://schemas.microsoft.com/office/thememl/2012/main" name="Office Theme" id="{62F939B6-93AF-4DB8-9C6B-D6C7DFDC589F}" vid="{4A3C46E8-61CC-4603-A589-7422A47A8E4A}"/>
     </a:ext>
   </a:extLst>
 </a:theme>
@@ -57507,7 +57520,7 @@
   <a:extraClrSchemeLst/>
   <a:extLst>
     <a:ext uri="{05A4C25C-085E-4340-85A3-A5531E510DB2}">
-      <thm15:themeFamily xmlns:thm15="http://schemas.microsoft.com/office/thememl/2012/main" xmlns="" name="Office Theme" id="{62F939B6-93AF-4DB8-9C6B-D6C7DFDC589F}" vid="{4A3C46E8-61CC-4603-A589-7422A47A8E4A}"/>
+      <thm15:themeFamily xmlns:thm15="http://schemas.microsoft.com/office/thememl/2012/main" name="Office Theme" id="{62F939B6-93AF-4DB8-9C6B-D6C7DFDC589F}" vid="{4A3C46E8-61CC-4603-A589-7422A47A8E4A}"/>
     </a:ext>
   </a:extLst>
 </a:theme>

</xml_diff>